<commit_message>
Minor updation in ppt and docx file
</commit_message>
<xml_diff>
--- a/Documents/Presentations/S-Park.pptx
+++ b/Documents/Presentations/S-Park.pptx
@@ -3423,19 +3423,7 @@
               <a:rPr lang="en-IN" sz="2000" dirty="0">
                 <a:sym typeface="+mn-ea"/>
               </a:rPr>
-              <a:t>available  </a:t>
-            </a:r>
-            <a:r>
-              <a:rPr lang="en-IN" sz="2000" dirty="0">
-                <a:sym typeface="+mn-ea"/>
-              </a:rPr>
-              <a:t>on the Campus / City / Resident Societies .</a:t>
-            </a:r>
-            <a:r>
-              <a:rPr lang="en-IN" sz="2000" dirty="0">
-                <a:sym typeface="+mn-ea"/>
-              </a:rPr>
-              <a:t>                </a:t>
+              <a:t>available  on the Campus / City / Resident Societies .                </a:t>
             </a:r>
             <a:endParaRPr lang="en-IN" sz="2000" dirty="0">
               <a:sym typeface="+mn-ea"/>
@@ -4339,7 +4327,7 @@
         <p:nvPicPr>
           <p:cNvPr id="10" name="Content Placeholder 9" descr="D:\IT\Hackathon\S-Park\Documents\Images\FlowChart.pngFlowChart"/>
           <p:cNvPicPr>
-            <a:picLocks noChangeAspect="1"/>
+            <a:picLocks noGrp="1" noChangeAspect="1"/>
           </p:cNvPicPr>
           <p:nvPr>
             <p:ph sz="half" idx="1"/>
@@ -4366,7 +4354,7 @@
         <p:nvPicPr>
           <p:cNvPr id="2" name="Content Placeholder 1" descr="SystemFlow"/>
           <p:cNvPicPr>
-            <a:picLocks noChangeAspect="1"/>
+            <a:picLocks noGrp="1" noChangeAspect="1"/>
           </p:cNvPicPr>
           <p:nvPr>
             <p:ph sz="half" idx="2"/>
@@ -4408,6 +4396,7 @@
           <a:bodyPr wrap="square" rtlCol="0">
             <a:spAutoFit/>
           </a:bodyPr>
+          <a:lstStyle/>
           <a:p>
             <a:pPr algn="ctr"/>
             <a:r>
@@ -4484,6 +4473,7 @@
           <a:bodyPr wrap="square" rtlCol="0">
             <a:spAutoFit/>
           </a:bodyPr>
+          <a:lstStyle/>
           <a:p>
             <a:pPr algn="ctr"/>
             <a:r>
@@ -4557,7 +4547,14 @@
         <p:cNvGrpSpPr/>
         <p:nvPr/>
       </p:nvGrpSpPr>
-      <p:grpSpPr/>
+      <p:grpSpPr>
+        <a:xfrm>
+          <a:off x="0" y="0"/>
+          <a:ext cx="0" cy="0"/>
+          <a:chOff x="0" y="0"/>
+          <a:chExt cx="0" cy="0"/>
+        </a:xfrm>
+      </p:grpSpPr>
       <p:sp>
         <p:nvSpPr>
           <p:cNvPr id="6" name="Text Box 5"/>
@@ -4578,6 +4575,7 @@
           <a:bodyPr wrap="square" rtlCol="0">
             <a:spAutoFit/>
           </a:bodyPr>
+          <a:lstStyle/>
           <a:p>
             <a:pPr algn="ctr"/>
             <a:r>
@@ -4761,33 +4759,13 @@
             </a:pPr>
             <a:r>
               <a:rPr lang="en-IN" altLang="en-US" dirty="0" smtClean="0"/>
-              <a:t>The </a:t>
-            </a:r>
-            <a:r>
-              <a:rPr lang="en-IN" altLang="en-US" b="1" dirty="0" smtClean="0"/>
-              <a:t>Parking slot</a:t>
-            </a:r>
-            <a:r>
-              <a:rPr lang="en-IN" altLang="en-US" dirty="0" smtClean="0"/>
-              <a:t> number and the car has </a:t>
-            </a:r>
-            <a:r>
-              <a:rPr lang="en-IN" altLang="en-US" b="1" dirty="0" smtClean="0"/>
-              <a:t>left the parking slot</a:t>
-            </a:r>
-            <a:r>
-              <a:rPr lang="en-IN" altLang="en-US" dirty="0" smtClean="0"/>
-              <a:t> details will also be </a:t>
-            </a:r>
-            <a:r>
-              <a:rPr lang="en-IN" altLang="en-US" b="1" dirty="0" smtClean="0"/>
-              <a:t>notified </a:t>
-            </a:r>
-            <a:r>
-              <a:rPr lang="en-IN" altLang="en-US" dirty="0" smtClean="0"/>
-              <a:t>to the user.</a:t>
-            </a:r>
-            <a:endParaRPr lang="en-IN" altLang="en-US" dirty="0" smtClean="0"/>
+              <a:t>When the user pulls out his vehicle for exiting, he will be notified on his app and this helps in preventing malpractices </a:t>
+            </a:r>
+            <a:r>
+              <a:rPr lang="en-IN" altLang="en-US" smtClean="0"/>
+              <a:t>(stealing).</a:t>
+            </a:r>
+            <a:endParaRPr lang="en-IN" altLang="en-US" smtClean="0"/>
           </a:p>
           <a:p>
             <a:pPr marL="285750" indent="-285750">
@@ -5125,7 +5103,7 @@
         <p:nvPicPr>
           <p:cNvPr id="7" name="Content Placeholder 6" descr="car-detect og"/>
           <p:cNvPicPr>
-            <a:picLocks noChangeAspect="1"/>
+            <a:picLocks noGrp="1" noChangeAspect="1"/>
           </p:cNvPicPr>
           <p:nvPr>
             <p:ph sz="half" idx="1"/>
@@ -5151,7 +5129,7 @@
         <p:nvPicPr>
           <p:cNvPr id="9" name="Content Placeholder 8" descr="D:\IT\Hackathon\S-Park\Documents\Locater Map.jpgLocater Map"/>
           <p:cNvPicPr>
-            <a:picLocks noChangeAspect="1"/>
+            <a:picLocks noGrp="1" noChangeAspect="1"/>
           </p:cNvPicPr>
           <p:nvPr>
             <p:ph sz="half" idx="2"/>
@@ -5194,6 +5172,7 @@
           <a:bodyPr wrap="square" rtlCol="0">
             <a:spAutoFit/>
           </a:bodyPr>
+          <a:lstStyle/>
           <a:p>
             <a:pPr algn="ctr"/>
             <a:r>
@@ -5270,6 +5249,7 @@
           <a:bodyPr wrap="square" rtlCol="0">
             <a:spAutoFit/>
           </a:bodyPr>
+          <a:lstStyle/>
           <a:p>
             <a:pPr algn="ctr"/>
             <a:r>
@@ -5737,7 +5717,7 @@
         <p:nvPicPr>
           <p:cNvPr id="15" name="Content Placeholder 14" descr="UseCase"/>
           <p:cNvPicPr>
-            <a:picLocks noChangeAspect="1"/>
+            <a:picLocks noGrp="1" noChangeAspect="1"/>
           </p:cNvPicPr>
           <p:nvPr>
             <p:ph idx="1"/>
@@ -5779,6 +5759,7 @@
           <a:bodyPr wrap="square" rtlCol="0">
             <a:spAutoFit/>
           </a:bodyPr>
+          <a:lstStyle/>
           <a:p>
             <a:pPr algn="ctr"/>
             <a:r>
@@ -5903,6 +5884,7 @@
         </p:style>
         <p:txBody>
           <a:bodyPr rtlCol="0" anchor="ctr"/>
+          <a:lstStyle/>
           <a:p>
             <a:pPr algn="ctr"/>
             <a:r>
@@ -5985,6 +5967,7 @@
         </p:style>
         <p:txBody>
           <a:bodyPr rtlCol="0" anchor="ctr"/>
+          <a:lstStyle/>
           <a:p>
             <a:pPr algn="ctr"/>
             <a:r>
@@ -6103,6 +6086,7 @@
         </p:style>
         <p:txBody>
           <a:bodyPr rtlCol="0" anchor="ctr"/>
+          <a:lstStyle/>
           <a:p>
             <a:pPr algn="ctr"/>
             <a:r>
@@ -6181,6 +6165,7 @@
         </p:style>
         <p:txBody>
           <a:bodyPr rtlCol="0" anchor="ctr"/>
+          <a:lstStyle/>
           <a:p>
             <a:pPr algn="ctr"/>
             <a:r>
@@ -6263,6 +6248,7 @@
         </p:style>
         <p:txBody>
           <a:bodyPr rtlCol="0" anchor="ctr"/>
+          <a:lstStyle/>
           <a:p>
             <a:pPr algn="ctr"/>
             <a:r>
@@ -6345,6 +6331,7 @@
         </p:style>
         <p:txBody>
           <a:bodyPr rtlCol="0" anchor="ctr"/>
+          <a:lstStyle/>
           <a:p>
             <a:pPr algn="ctr"/>
             <a:r>

</xml_diff>